<commit_message>
Adding video to introduction
</commit_message>
<xml_diff>
--- a/lectures/introduction/introduction.pptx
+++ b/lectures/introduction/introduction.pptx
@@ -23,7 +23,7 @@
     <p:sldId id="740" r:id="rId11"/>
     <p:sldId id="744" r:id="rId12"/>
     <p:sldId id="745" r:id="rId13"/>
-    <p:sldId id="728" r:id="rId14"/>
+    <p:sldId id="746" r:id="rId14"/>
     <p:sldId id="730" r:id="rId15"/>
     <p:sldId id="741" r:id="rId16"/>
     <p:sldId id="725" r:id="rId17"/>
@@ -233,7 +233,7 @@
           <a:p>
             <a:fld id="{8DE5C130-53D6-4AA2-8373-A059CD33995D}" type="datetimeFigureOut">
               <a:rPr lang="en-US" smtClean="0"/>
-              <a:t>1/16/2021</a:t>
+              <a:t>1/19/2021</a:t>
             </a:fld>
             <a:endParaRPr lang="en-US"/>
           </a:p>
@@ -398,7 +398,7 @@
           <a:p>
             <a:fld id="{955F5B5B-1AF5-41D1-A365-E1E0634C44A6}" type="datetimeFigureOut">
               <a:rPr lang="en-US" smtClean="0"/>
-              <a:t>1/16/2021</a:t>
+              <a:t>1/19/2021</a:t>
             </a:fld>
             <a:endParaRPr lang="en-US"/>
           </a:p>
@@ -3117,7 +3117,7 @@
         </p:nvSpPr>
         <p:spPr>
           <a:xfrm>
-            <a:off x="76200" y="2480620"/>
+            <a:off x="76200" y="3033948"/>
             <a:ext cx="8996179" cy="487362"/>
           </a:xfrm>
         </p:spPr>
@@ -3954,7 +3954,7 @@
                 <a:latin typeface="Arial" pitchFamily="34" charset="0"/>
                 <a:cs typeface="Arial" pitchFamily="34" charset="0"/>
               </a:rPr>
-              <a:t>Extensible - it will work 2, 200, or 20,000 mice, and is easily modified</a:t>
+              <a:t>Extensible - it will work with 2, 200, or 20,000 mice, and is easily modified</a:t>
             </a:r>
           </a:p>
           <a:p>
@@ -4227,7 +4227,7 @@
                 <a:latin typeface="Arial" pitchFamily="34" charset="0"/>
                 <a:cs typeface="Arial" pitchFamily="34" charset="0"/>
               </a:rPr>
-              <a:t>Extensible - it will work 2, 200, or 20,000 mice, and is easily modified</a:t>
+              <a:t>Extensible - it will work with 2, 200, or 20,000 mice, and is easily modified</a:t>
             </a:r>
           </a:p>
           <a:p>
@@ -4307,7 +4307,7 @@
           <p:cNvPr id="5" name="Rectangular Callout 3">
             <a:extLst>
               <a:ext uri="{FF2B5EF4-FFF2-40B4-BE49-F238E27FC236}">
-                <a16:creationId xmlns:a16="http://schemas.microsoft.com/office/drawing/2014/main" id="{EE63137A-BD37-44E4-A6E0-87ED3304C959}"/>
+                <a16:creationId xmlns:a16="http://schemas.microsoft.com/office/drawing/2014/main" id="{4F590663-7563-4F96-BF13-3D86321F5287}"/>
               </a:ext>
             </a:extLst>
           </p:cNvPr>
@@ -4316,7 +4316,7 @@
         </p:nvSpPr>
         <p:spPr>
           <a:xfrm>
-            <a:off x="1312536" y="3521971"/>
+            <a:off x="1199219" y="3463985"/>
             <a:ext cx="6877688" cy="2230742"/>
           </a:xfrm>
           <a:prstGeom prst="wedgeRectCallout">
@@ -4368,7 +4368,7 @@
     </p:spTree>
     <p:extLst>
       <p:ext uri="{BB962C8B-B14F-4D97-AF65-F5344CB8AC3E}">
-        <p14:creationId xmlns:p14="http://schemas.microsoft.com/office/powerpoint/2010/main" val="3133771441"/>
+        <p14:creationId xmlns:p14="http://schemas.microsoft.com/office/powerpoint/2010/main" val="163545519"/>
       </p:ext>
     </p:extLst>
   </p:cSld>
@@ -4796,7 +4796,7 @@
                 <a:latin typeface="Arial" pitchFamily="34" charset="0"/>
                 <a:cs typeface="Arial" pitchFamily="34" charset="0"/>
               </a:rPr>
-              <a:t>Turn you into an expert</a:t>
+              <a:t>Turn you into an expert in quantitative methods</a:t>
             </a:r>
           </a:p>
           <a:p>

</xml_diff>